<commit_message>
note price vs rating
</commit_message>
<xml_diff>
--- a/Figure.pptx
+++ b/Figure.pptx
@@ -5,11 +5,13 @@
     <p:sldMasterId id="2147483648" r:id="rId1"/>
   </p:sldMasterIdLst>
   <p:notesMasterIdLst>
-    <p:notesMasterId r:id="rId4"/>
+    <p:notesMasterId r:id="rId6"/>
   </p:notesMasterIdLst>
   <p:sldIdLst>
     <p:sldId id="256" r:id="rId2"/>
     <p:sldId id="257" r:id="rId3"/>
+    <p:sldId id="258" r:id="rId4"/>
+    <p:sldId id="259" r:id="rId5"/>
   </p:sldIdLst>
   <p:sldSz cx="12192000" cy="6858000"/>
   <p:notesSz cx="6858000" cy="9144000"/>
@@ -108,6 +110,11 @@
       </a:defRPr>
     </a:lvl9pPr>
   </p:defaultTextStyle>
+  <p:extLst>
+    <p:ext uri="{EFAFB233-063F-42B5-8137-9DF3F51BA10A}">
+      <p15:sldGuideLst xmlns:p15="http://schemas.microsoft.com/office/powerpoint/2012/main"/>
+    </p:ext>
+  </p:extLst>
 </p:presentation>
 </file>
 
@@ -193,7 +200,7 @@
           <a:p>
             <a:fld id="{B2556B05-391B-8345-83EC-E8E72A5FD6FF}" type="datetimeFigureOut">
               <a:rPr lang="en-US" smtClean="0"/>
-              <a:t>9/3/24</a:t>
+              <a:t>9/5/24</a:t>
             </a:fld>
             <a:endParaRPr lang="en-US"/>
           </a:p>
@@ -694,7 +701,7 @@
           <a:p>
             <a:fld id="{2BF1D306-49A3-A045-9F05-A1AFEEEED0A3}" type="datetimeFigureOut">
               <a:rPr lang="en-US" smtClean="0"/>
-              <a:t>9/3/24</a:t>
+              <a:t>9/5/24</a:t>
             </a:fld>
             <a:endParaRPr lang="en-US"/>
           </a:p>
@@ -892,7 +899,7 @@
           <a:p>
             <a:fld id="{2BF1D306-49A3-A045-9F05-A1AFEEEED0A3}" type="datetimeFigureOut">
               <a:rPr lang="en-US" smtClean="0"/>
-              <a:t>9/3/24</a:t>
+              <a:t>9/5/24</a:t>
             </a:fld>
             <a:endParaRPr lang="en-US"/>
           </a:p>
@@ -1100,7 +1107,7 @@
           <a:p>
             <a:fld id="{2BF1D306-49A3-A045-9F05-A1AFEEEED0A3}" type="datetimeFigureOut">
               <a:rPr lang="en-US" smtClean="0"/>
-              <a:t>9/3/24</a:t>
+              <a:t>9/5/24</a:t>
             </a:fld>
             <a:endParaRPr lang="en-US"/>
           </a:p>
@@ -1298,7 +1305,7 @@
           <a:p>
             <a:fld id="{2BF1D306-49A3-A045-9F05-A1AFEEEED0A3}" type="datetimeFigureOut">
               <a:rPr lang="en-US" smtClean="0"/>
-              <a:t>9/3/24</a:t>
+              <a:t>9/5/24</a:t>
             </a:fld>
             <a:endParaRPr lang="en-US"/>
           </a:p>
@@ -1573,7 +1580,7 @@
           <a:p>
             <a:fld id="{2BF1D306-49A3-A045-9F05-A1AFEEEED0A3}" type="datetimeFigureOut">
               <a:rPr lang="en-US" smtClean="0"/>
-              <a:t>9/3/24</a:t>
+              <a:t>9/5/24</a:t>
             </a:fld>
             <a:endParaRPr lang="en-US"/>
           </a:p>
@@ -1838,7 +1845,7 @@
           <a:p>
             <a:fld id="{2BF1D306-49A3-A045-9F05-A1AFEEEED0A3}" type="datetimeFigureOut">
               <a:rPr lang="en-US" smtClean="0"/>
-              <a:t>9/3/24</a:t>
+              <a:t>9/5/24</a:t>
             </a:fld>
             <a:endParaRPr lang="en-US"/>
           </a:p>
@@ -2250,7 +2257,7 @@
           <a:p>
             <a:fld id="{2BF1D306-49A3-A045-9F05-A1AFEEEED0A3}" type="datetimeFigureOut">
               <a:rPr lang="en-US" smtClean="0"/>
-              <a:t>9/3/24</a:t>
+              <a:t>9/5/24</a:t>
             </a:fld>
             <a:endParaRPr lang="en-US"/>
           </a:p>
@@ -2391,7 +2398,7 @@
           <a:p>
             <a:fld id="{2BF1D306-49A3-A045-9F05-A1AFEEEED0A3}" type="datetimeFigureOut">
               <a:rPr lang="en-US" smtClean="0"/>
-              <a:t>9/3/24</a:t>
+              <a:t>9/5/24</a:t>
             </a:fld>
             <a:endParaRPr lang="en-US"/>
           </a:p>
@@ -2504,7 +2511,7 @@
           <a:p>
             <a:fld id="{2BF1D306-49A3-A045-9F05-A1AFEEEED0A3}" type="datetimeFigureOut">
               <a:rPr lang="en-US" smtClean="0"/>
-              <a:t>9/3/24</a:t>
+              <a:t>9/5/24</a:t>
             </a:fld>
             <a:endParaRPr lang="en-US"/>
           </a:p>
@@ -2815,7 +2822,7 @@
           <a:p>
             <a:fld id="{2BF1D306-49A3-A045-9F05-A1AFEEEED0A3}" type="datetimeFigureOut">
               <a:rPr lang="en-US" smtClean="0"/>
-              <a:t>9/3/24</a:t>
+              <a:t>9/5/24</a:t>
             </a:fld>
             <a:endParaRPr lang="en-US"/>
           </a:p>
@@ -3103,7 +3110,7 @@
           <a:p>
             <a:fld id="{2BF1D306-49A3-A045-9F05-A1AFEEEED0A3}" type="datetimeFigureOut">
               <a:rPr lang="en-US" smtClean="0"/>
-              <a:t>9/3/24</a:t>
+              <a:t>9/5/24</a:t>
             </a:fld>
             <a:endParaRPr lang="en-US"/>
           </a:p>
@@ -3344,7 +3351,7 @@
           <a:p>
             <a:fld id="{2BF1D306-49A3-A045-9F05-A1AFEEEED0A3}" type="datetimeFigureOut">
               <a:rPr lang="en-US" smtClean="0"/>
-              <a:t>9/3/24</a:t>
+              <a:t>9/5/24</a:t>
             </a:fld>
             <a:endParaRPr lang="en-US"/>
           </a:p>
@@ -4819,6 +4826,335 @@
     <p:extLst>
       <p:ext uri="{BB962C8B-B14F-4D97-AF65-F5344CB8AC3E}">
         <p14:creationId xmlns:p14="http://schemas.microsoft.com/office/powerpoint/2010/main" val="1183811528"/>
+      </p:ext>
+    </p:extLst>
+  </p:cSld>
+  <p:clrMapOvr>
+    <a:masterClrMapping/>
+  </p:clrMapOvr>
+</p:sld>
+</file>
+
+<file path=ppt/slides/slide3.xml><?xml version="1.0" encoding="utf-8"?>
+<p:sld xmlns:a="http://schemas.openxmlformats.org/drawingml/2006/main" xmlns:r="http://schemas.openxmlformats.org/officeDocument/2006/relationships" xmlns:p="http://schemas.openxmlformats.org/presentationml/2006/main">
+  <p:cSld>
+    <p:spTree>
+      <p:nvGrpSpPr>
+        <p:cNvPr id="1" name=""/>
+        <p:cNvGrpSpPr/>
+        <p:nvPr/>
+      </p:nvGrpSpPr>
+      <p:grpSpPr>
+        <a:xfrm>
+          <a:off x="0" y="0"/>
+          <a:ext cx="0" cy="0"/>
+          <a:chOff x="0" y="0"/>
+          <a:chExt cx="0" cy="0"/>
+        </a:xfrm>
+      </p:grpSpPr>
+      <p:grpSp>
+        <p:nvGrpSpPr>
+          <p:cNvPr id="10" name="Group 9">
+            <a:extLst>
+              <a:ext uri="{FF2B5EF4-FFF2-40B4-BE49-F238E27FC236}">
+                <a16:creationId xmlns:a16="http://schemas.microsoft.com/office/drawing/2014/main" id="{02A49389-4953-8564-7AFC-11568F56BF9B}"/>
+              </a:ext>
+            </a:extLst>
+          </p:cNvPr>
+          <p:cNvGrpSpPr/>
+          <p:nvPr/>
+        </p:nvGrpSpPr>
+        <p:grpSpPr>
+          <a:xfrm>
+            <a:off x="391960" y="272528"/>
+            <a:ext cx="6722824" cy="4258733"/>
+            <a:chOff x="391960" y="272528"/>
+            <a:chExt cx="6722824" cy="4258733"/>
+          </a:xfrm>
+        </p:grpSpPr>
+        <p:pic>
+          <p:nvPicPr>
+            <p:cNvPr id="8" name="Picture 7" descr="A graph with different colored squares&#10;&#10;Description automatically generated">
+              <a:extLst>
+                <a:ext uri="{FF2B5EF4-FFF2-40B4-BE49-F238E27FC236}">
+                  <a16:creationId xmlns:a16="http://schemas.microsoft.com/office/drawing/2014/main" id="{4A18A7B9-C41F-72A3-AABD-DEB2AF50185F}"/>
+                </a:ext>
+              </a:extLst>
+            </p:cNvPr>
+            <p:cNvPicPr>
+              <a:picLocks noChangeAspect="1"/>
+            </p:cNvPicPr>
+            <p:nvPr/>
+          </p:nvPicPr>
+          <p:blipFill>
+            <a:blip r:embed="rId2"/>
+            <a:srcRect r="13504"/>
+            <a:stretch/>
+          </p:blipFill>
+          <p:spPr>
+            <a:xfrm>
+              <a:off x="391960" y="272528"/>
+              <a:ext cx="6722824" cy="4258733"/>
+            </a:xfrm>
+            <a:prstGeom prst="rect">
+              <a:avLst/>
+            </a:prstGeom>
+          </p:spPr>
+        </p:pic>
+        <p:pic>
+          <p:nvPicPr>
+            <p:cNvPr id="6" name="Picture 5" descr="A graph of different colored bars&#10;&#10;Description automatically generated">
+              <a:extLst>
+                <a:ext uri="{FF2B5EF4-FFF2-40B4-BE49-F238E27FC236}">
+                  <a16:creationId xmlns:a16="http://schemas.microsoft.com/office/drawing/2014/main" id="{2B876C0F-65AD-AB8E-3D5E-01EE89C5D1CA}"/>
+                </a:ext>
+              </a:extLst>
+            </p:cNvPr>
+            <p:cNvPicPr>
+              <a:picLocks noChangeAspect="1"/>
+            </p:cNvPicPr>
+            <p:nvPr/>
+          </p:nvPicPr>
+          <p:blipFill>
+            <a:blip r:embed="rId3"/>
+            <a:stretch>
+              <a:fillRect/>
+            </a:stretch>
+          </p:blipFill>
+          <p:spPr>
+            <a:xfrm>
+              <a:off x="4020855" y="1812069"/>
+              <a:ext cx="2892479" cy="2349095"/>
+            </a:xfrm>
+            <a:prstGeom prst="rect">
+              <a:avLst/>
+            </a:prstGeom>
+          </p:spPr>
+        </p:pic>
+        <p:pic>
+          <p:nvPicPr>
+            <p:cNvPr id="9" name="Picture 8" descr="A graph with different colored squares&#10;&#10;Description automatically generated">
+              <a:extLst>
+                <a:ext uri="{FF2B5EF4-FFF2-40B4-BE49-F238E27FC236}">
+                  <a16:creationId xmlns:a16="http://schemas.microsoft.com/office/drawing/2014/main" id="{425B0694-11B9-31D6-07A6-24EB1A664CBE}"/>
+                </a:ext>
+              </a:extLst>
+            </p:cNvPr>
+            <p:cNvPicPr>
+              <a:picLocks noChangeAspect="1"/>
+            </p:cNvPicPr>
+            <p:nvPr/>
+          </p:nvPicPr>
+          <p:blipFill>
+            <a:blip r:embed="rId2"/>
+            <a:srcRect l="89041" t="3846" r="-1961" b="72330"/>
+            <a:stretch/>
+          </p:blipFill>
+          <p:spPr>
+            <a:xfrm>
+              <a:off x="2545034" y="2921695"/>
+              <a:ext cx="1004170" cy="1014609"/>
+            </a:xfrm>
+            <a:prstGeom prst="rect">
+              <a:avLst/>
+            </a:prstGeom>
+          </p:spPr>
+        </p:pic>
+      </p:grpSp>
+    </p:spTree>
+    <p:extLst>
+      <p:ext uri="{BB962C8B-B14F-4D97-AF65-F5344CB8AC3E}">
+        <p14:creationId xmlns:p14="http://schemas.microsoft.com/office/powerpoint/2010/main" val="3742277261"/>
+      </p:ext>
+    </p:extLst>
+  </p:cSld>
+  <p:clrMapOvr>
+    <a:masterClrMapping/>
+  </p:clrMapOvr>
+</p:sld>
+</file>
+
+<file path=ppt/slides/slide4.xml><?xml version="1.0" encoding="utf-8"?>
+<p:sld xmlns:a="http://schemas.openxmlformats.org/drawingml/2006/main" xmlns:r="http://schemas.openxmlformats.org/officeDocument/2006/relationships" xmlns:p="http://schemas.openxmlformats.org/presentationml/2006/main">
+  <p:cSld>
+    <p:spTree>
+      <p:nvGrpSpPr>
+        <p:cNvPr id="1" name=""/>
+        <p:cNvGrpSpPr/>
+        <p:nvPr/>
+      </p:nvGrpSpPr>
+      <p:grpSpPr>
+        <a:xfrm>
+          <a:off x="0" y="0"/>
+          <a:ext cx="0" cy="0"/>
+          <a:chOff x="0" y="0"/>
+          <a:chExt cx="0" cy="0"/>
+        </a:xfrm>
+      </p:grpSpPr>
+      <p:grpSp>
+        <p:nvGrpSpPr>
+          <p:cNvPr id="21" name="Group 20">
+            <a:extLst>
+              <a:ext uri="{FF2B5EF4-FFF2-40B4-BE49-F238E27FC236}">
+                <a16:creationId xmlns:a16="http://schemas.microsoft.com/office/drawing/2014/main" id="{8980C1DB-8ECA-C775-8C09-61D95FE0C2F4}"/>
+              </a:ext>
+            </a:extLst>
+          </p:cNvPr>
+          <p:cNvGrpSpPr/>
+          <p:nvPr/>
+        </p:nvGrpSpPr>
+        <p:grpSpPr>
+          <a:xfrm>
+            <a:off x="3606911" y="3620022"/>
+            <a:ext cx="6889900" cy="3012510"/>
+            <a:chOff x="3606911" y="3620022"/>
+            <a:chExt cx="6889900" cy="3012510"/>
+          </a:xfrm>
+        </p:grpSpPr>
+        <p:pic>
+          <p:nvPicPr>
+            <p:cNvPr id="13" name="Picture 12" descr="A graph of a bar graph&#10;&#10;Description automatically generated">
+              <a:extLst>
+                <a:ext uri="{FF2B5EF4-FFF2-40B4-BE49-F238E27FC236}">
+                  <a16:creationId xmlns:a16="http://schemas.microsoft.com/office/drawing/2014/main" id="{5C9C3E94-9902-B943-CD37-ADD10993C881}"/>
+                </a:ext>
+              </a:extLst>
+            </p:cNvPr>
+            <p:cNvPicPr>
+              <a:picLocks noChangeAspect="1"/>
+            </p:cNvPicPr>
+            <p:nvPr/>
+          </p:nvPicPr>
+          <p:blipFill>
+            <a:blip r:embed="rId2"/>
+            <a:srcRect t="6191" b="3006"/>
+            <a:stretch/>
+          </p:blipFill>
+          <p:spPr>
+            <a:xfrm>
+              <a:off x="8600032" y="3845490"/>
+              <a:ext cx="1896779" cy="2755726"/>
+            </a:xfrm>
+            <a:prstGeom prst="rect">
+              <a:avLst/>
+            </a:prstGeom>
+          </p:spPr>
+        </p:pic>
+        <p:pic>
+          <p:nvPicPr>
+            <p:cNvPr id="15" name="Picture 14" descr="A diagram of a bar graph&#10;&#10;Description automatically generated">
+              <a:extLst>
+                <a:ext uri="{FF2B5EF4-FFF2-40B4-BE49-F238E27FC236}">
+                  <a16:creationId xmlns:a16="http://schemas.microsoft.com/office/drawing/2014/main" id="{650E2668-2110-EEFE-8AB4-425DB1B69D56}"/>
+                </a:ext>
+              </a:extLst>
+            </p:cNvPr>
+            <p:cNvPicPr>
+              <a:picLocks noChangeAspect="1"/>
+            </p:cNvPicPr>
+            <p:nvPr/>
+          </p:nvPicPr>
+          <p:blipFill>
+            <a:blip r:embed="rId3"/>
+            <a:stretch>
+              <a:fillRect/>
+            </a:stretch>
+          </p:blipFill>
+          <p:spPr>
+            <a:xfrm>
+              <a:off x="3606911" y="3620022"/>
+              <a:ext cx="5020850" cy="3012510"/>
+            </a:xfrm>
+            <a:prstGeom prst="rect">
+              <a:avLst/>
+            </a:prstGeom>
+          </p:spPr>
+        </p:pic>
+      </p:grpSp>
+      <p:grpSp>
+        <p:nvGrpSpPr>
+          <p:cNvPr id="20" name="Group 19">
+            <a:extLst>
+              <a:ext uri="{FF2B5EF4-FFF2-40B4-BE49-F238E27FC236}">
+                <a16:creationId xmlns:a16="http://schemas.microsoft.com/office/drawing/2014/main" id="{7C25AD8A-3C59-B82C-DF43-B495FA42D6CA}"/>
+              </a:ext>
+            </a:extLst>
+          </p:cNvPr>
+          <p:cNvGrpSpPr/>
+          <p:nvPr/>
+        </p:nvGrpSpPr>
+        <p:grpSpPr>
+          <a:xfrm>
+            <a:off x="3606911" y="749682"/>
+            <a:ext cx="6889900" cy="3014389"/>
+            <a:chOff x="3606911" y="749682"/>
+            <a:chExt cx="6889900" cy="3014389"/>
+          </a:xfrm>
+        </p:grpSpPr>
+        <p:pic>
+          <p:nvPicPr>
+            <p:cNvPr id="17" name="Picture 16" descr="A diagram of a bar chart&#10;&#10;Description automatically generated">
+              <a:extLst>
+                <a:ext uri="{FF2B5EF4-FFF2-40B4-BE49-F238E27FC236}">
+                  <a16:creationId xmlns:a16="http://schemas.microsoft.com/office/drawing/2014/main" id="{CAD06410-2D85-6DBE-2519-91F9F494FB89}"/>
+                </a:ext>
+              </a:extLst>
+            </p:cNvPr>
+            <p:cNvPicPr>
+              <a:picLocks noChangeAspect="1"/>
+            </p:cNvPicPr>
+            <p:nvPr/>
+          </p:nvPicPr>
+          <p:blipFill>
+            <a:blip r:embed="rId4"/>
+            <a:stretch>
+              <a:fillRect/>
+            </a:stretch>
+          </p:blipFill>
+          <p:spPr>
+            <a:xfrm>
+              <a:off x="3606911" y="749682"/>
+              <a:ext cx="5023982" cy="3014389"/>
+            </a:xfrm>
+            <a:prstGeom prst="rect">
+              <a:avLst/>
+            </a:prstGeom>
+          </p:spPr>
+        </p:pic>
+        <p:pic>
+          <p:nvPicPr>
+            <p:cNvPr id="19" name="Picture 18" descr="A graph of a bar chart&#10;&#10;Description automatically generated with medium confidence">
+              <a:extLst>
+                <a:ext uri="{FF2B5EF4-FFF2-40B4-BE49-F238E27FC236}">
+                  <a16:creationId xmlns:a16="http://schemas.microsoft.com/office/drawing/2014/main" id="{9FB50348-B58A-65C8-2CC0-EC16F5A68745}"/>
+                </a:ext>
+              </a:extLst>
+            </p:cNvPr>
+            <p:cNvPicPr>
+              <a:picLocks noChangeAspect="1"/>
+            </p:cNvPicPr>
+            <p:nvPr/>
+          </p:nvPicPr>
+          <p:blipFill>
+            <a:blip r:embed="rId5"/>
+            <a:srcRect t="8320" b="3766"/>
+            <a:stretch/>
+          </p:blipFill>
+          <p:spPr>
+            <a:xfrm>
+              <a:off x="8600033" y="989556"/>
+              <a:ext cx="1896778" cy="2668044"/>
+            </a:xfrm>
+            <a:prstGeom prst="rect">
+              <a:avLst/>
+            </a:prstGeom>
+          </p:spPr>
+        </p:pic>
+      </p:grpSp>
+    </p:spTree>
+    <p:extLst>
+      <p:ext uri="{BB962C8B-B14F-4D97-AF65-F5344CB8AC3E}">
+        <p14:creationId xmlns:p14="http://schemas.microsoft.com/office/powerpoint/2010/main" val="584115016"/>
       </p:ext>
     </p:extLst>
   </p:cSld>

</xml_diff>

<commit_message>
price vs rating // breakpoints
</commit_message>
<xml_diff>
--- a/Figure.pptx
+++ b/Figure.pptx
@@ -200,7 +200,7 @@
           <a:p>
             <a:fld id="{B2556B05-391B-8345-83EC-E8E72A5FD6FF}" type="datetimeFigureOut">
               <a:rPr lang="en-US" smtClean="0"/>
-              <a:t>9/5/24</a:t>
+              <a:t>9/7/24</a:t>
             </a:fld>
             <a:endParaRPr lang="en-US"/>
           </a:p>
@@ -701,7 +701,7 @@
           <a:p>
             <a:fld id="{2BF1D306-49A3-A045-9F05-A1AFEEEED0A3}" type="datetimeFigureOut">
               <a:rPr lang="en-US" smtClean="0"/>
-              <a:t>9/5/24</a:t>
+              <a:t>9/7/24</a:t>
             </a:fld>
             <a:endParaRPr lang="en-US"/>
           </a:p>
@@ -899,7 +899,7 @@
           <a:p>
             <a:fld id="{2BF1D306-49A3-A045-9F05-A1AFEEEED0A3}" type="datetimeFigureOut">
               <a:rPr lang="en-US" smtClean="0"/>
-              <a:t>9/5/24</a:t>
+              <a:t>9/7/24</a:t>
             </a:fld>
             <a:endParaRPr lang="en-US"/>
           </a:p>
@@ -1107,7 +1107,7 @@
           <a:p>
             <a:fld id="{2BF1D306-49A3-A045-9F05-A1AFEEEED0A3}" type="datetimeFigureOut">
               <a:rPr lang="en-US" smtClean="0"/>
-              <a:t>9/5/24</a:t>
+              <a:t>9/7/24</a:t>
             </a:fld>
             <a:endParaRPr lang="en-US"/>
           </a:p>
@@ -1305,7 +1305,7 @@
           <a:p>
             <a:fld id="{2BF1D306-49A3-A045-9F05-A1AFEEEED0A3}" type="datetimeFigureOut">
               <a:rPr lang="en-US" smtClean="0"/>
-              <a:t>9/5/24</a:t>
+              <a:t>9/7/24</a:t>
             </a:fld>
             <a:endParaRPr lang="en-US"/>
           </a:p>
@@ -1580,7 +1580,7 @@
           <a:p>
             <a:fld id="{2BF1D306-49A3-A045-9F05-A1AFEEEED0A3}" type="datetimeFigureOut">
               <a:rPr lang="en-US" smtClean="0"/>
-              <a:t>9/5/24</a:t>
+              <a:t>9/7/24</a:t>
             </a:fld>
             <a:endParaRPr lang="en-US"/>
           </a:p>
@@ -1845,7 +1845,7 @@
           <a:p>
             <a:fld id="{2BF1D306-49A3-A045-9F05-A1AFEEEED0A3}" type="datetimeFigureOut">
               <a:rPr lang="en-US" smtClean="0"/>
-              <a:t>9/5/24</a:t>
+              <a:t>9/7/24</a:t>
             </a:fld>
             <a:endParaRPr lang="en-US"/>
           </a:p>
@@ -2257,7 +2257,7 @@
           <a:p>
             <a:fld id="{2BF1D306-49A3-A045-9F05-A1AFEEEED0A3}" type="datetimeFigureOut">
               <a:rPr lang="en-US" smtClean="0"/>
-              <a:t>9/5/24</a:t>
+              <a:t>9/7/24</a:t>
             </a:fld>
             <a:endParaRPr lang="en-US"/>
           </a:p>
@@ -2398,7 +2398,7 @@
           <a:p>
             <a:fld id="{2BF1D306-49A3-A045-9F05-A1AFEEEED0A3}" type="datetimeFigureOut">
               <a:rPr lang="en-US" smtClean="0"/>
-              <a:t>9/5/24</a:t>
+              <a:t>9/7/24</a:t>
             </a:fld>
             <a:endParaRPr lang="en-US"/>
           </a:p>
@@ -2511,7 +2511,7 @@
           <a:p>
             <a:fld id="{2BF1D306-49A3-A045-9F05-A1AFEEEED0A3}" type="datetimeFigureOut">
               <a:rPr lang="en-US" smtClean="0"/>
-              <a:t>9/5/24</a:t>
+              <a:t>9/7/24</a:t>
             </a:fld>
             <a:endParaRPr lang="en-US"/>
           </a:p>
@@ -2822,7 +2822,7 @@
           <a:p>
             <a:fld id="{2BF1D306-49A3-A045-9F05-A1AFEEEED0A3}" type="datetimeFigureOut">
               <a:rPr lang="en-US" smtClean="0"/>
-              <a:t>9/5/24</a:t>
+              <a:t>9/7/24</a:t>
             </a:fld>
             <a:endParaRPr lang="en-US"/>
           </a:p>
@@ -3110,7 +3110,7 @@
           <a:p>
             <a:fld id="{2BF1D306-49A3-A045-9F05-A1AFEEEED0A3}" type="datetimeFigureOut">
               <a:rPr lang="en-US" smtClean="0"/>
-              <a:t>9/5/24</a:t>
+              <a:t>9/7/24</a:t>
             </a:fld>
             <a:endParaRPr lang="en-US"/>
           </a:p>
@@ -3351,7 +3351,7 @@
           <a:p>
             <a:fld id="{2BF1D306-49A3-A045-9F05-A1AFEEEED0A3}" type="datetimeFigureOut">
               <a:rPr lang="en-US" smtClean="0"/>
-              <a:t>9/5/24</a:t>
+              <a:t>9/7/24</a:t>
             </a:fld>
             <a:endParaRPr lang="en-US"/>
           </a:p>
@@ -4993,86 +4993,6 @@
       </p:grpSpPr>
       <p:grpSp>
         <p:nvGrpSpPr>
-          <p:cNvPr id="21" name="Group 20">
-            <a:extLst>
-              <a:ext uri="{FF2B5EF4-FFF2-40B4-BE49-F238E27FC236}">
-                <a16:creationId xmlns:a16="http://schemas.microsoft.com/office/drawing/2014/main" id="{8980C1DB-8ECA-C775-8C09-61D95FE0C2F4}"/>
-              </a:ext>
-            </a:extLst>
-          </p:cNvPr>
-          <p:cNvGrpSpPr/>
-          <p:nvPr/>
-        </p:nvGrpSpPr>
-        <p:grpSpPr>
-          <a:xfrm>
-            <a:off x="3606911" y="3620022"/>
-            <a:ext cx="6889900" cy="3012510"/>
-            <a:chOff x="3606911" y="3620022"/>
-            <a:chExt cx="6889900" cy="3012510"/>
-          </a:xfrm>
-        </p:grpSpPr>
-        <p:pic>
-          <p:nvPicPr>
-            <p:cNvPr id="13" name="Picture 12" descr="A graph of a bar graph&#10;&#10;Description automatically generated">
-              <a:extLst>
-                <a:ext uri="{FF2B5EF4-FFF2-40B4-BE49-F238E27FC236}">
-                  <a16:creationId xmlns:a16="http://schemas.microsoft.com/office/drawing/2014/main" id="{5C9C3E94-9902-B943-CD37-ADD10993C881}"/>
-                </a:ext>
-              </a:extLst>
-            </p:cNvPr>
-            <p:cNvPicPr>
-              <a:picLocks noChangeAspect="1"/>
-            </p:cNvPicPr>
-            <p:nvPr/>
-          </p:nvPicPr>
-          <p:blipFill>
-            <a:blip r:embed="rId2"/>
-            <a:srcRect t="6191" b="3006"/>
-            <a:stretch/>
-          </p:blipFill>
-          <p:spPr>
-            <a:xfrm>
-              <a:off x="8600032" y="3845490"/>
-              <a:ext cx="1896779" cy="2755726"/>
-            </a:xfrm>
-            <a:prstGeom prst="rect">
-              <a:avLst/>
-            </a:prstGeom>
-          </p:spPr>
-        </p:pic>
-        <p:pic>
-          <p:nvPicPr>
-            <p:cNvPr id="15" name="Picture 14" descr="A diagram of a bar graph&#10;&#10;Description automatically generated">
-              <a:extLst>
-                <a:ext uri="{FF2B5EF4-FFF2-40B4-BE49-F238E27FC236}">
-                  <a16:creationId xmlns:a16="http://schemas.microsoft.com/office/drawing/2014/main" id="{650E2668-2110-EEFE-8AB4-425DB1B69D56}"/>
-                </a:ext>
-              </a:extLst>
-            </p:cNvPr>
-            <p:cNvPicPr>
-              <a:picLocks noChangeAspect="1"/>
-            </p:cNvPicPr>
-            <p:nvPr/>
-          </p:nvPicPr>
-          <p:blipFill>
-            <a:blip r:embed="rId3"/>
-            <a:stretch>
-              <a:fillRect/>
-            </a:stretch>
-          </p:blipFill>
-          <p:spPr>
-            <a:xfrm>
-              <a:off x="3606911" y="3620022"/>
-              <a:ext cx="5020850" cy="3012510"/>
-            </a:xfrm>
-            <a:prstGeom prst="rect">
-              <a:avLst/>
-            </a:prstGeom>
-          </p:spPr>
-        </p:pic>
-      </p:grpSp>
-      <p:grpSp>
-        <p:nvGrpSpPr>
           <p:cNvPr id="20" name="Group 19">
             <a:extLst>
               <a:ext uri="{FF2B5EF4-FFF2-40B4-BE49-F238E27FC236}">
@@ -5106,7 +5026,7 @@
             <p:nvPr/>
           </p:nvPicPr>
           <p:blipFill>
-            <a:blip r:embed="rId4"/>
+            <a:blip r:embed="rId2"/>
             <a:stretch>
               <a:fillRect/>
             </a:stretch>
@@ -5136,7 +5056,7 @@
             <p:nvPr/>
           </p:nvPicPr>
           <p:blipFill>
-            <a:blip r:embed="rId5"/>
+            <a:blip r:embed="rId3"/>
             <a:srcRect t="8320" b="3766"/>
             <a:stretch/>
           </p:blipFill>
@@ -5144,6 +5064,85 @@
             <a:xfrm>
               <a:off x="8600033" y="989556"/>
               <a:ext cx="1896778" cy="2668044"/>
+            </a:xfrm>
+            <a:prstGeom prst="rect">
+              <a:avLst/>
+            </a:prstGeom>
+          </p:spPr>
+        </p:pic>
+      </p:grpSp>
+      <p:grpSp>
+        <p:nvGrpSpPr>
+          <p:cNvPr id="4" name="Group 3">
+            <a:extLst>
+              <a:ext uri="{FF2B5EF4-FFF2-40B4-BE49-F238E27FC236}">
+                <a16:creationId xmlns:a16="http://schemas.microsoft.com/office/drawing/2014/main" id="{500F12AE-C202-8995-2296-47C993A4A531}"/>
+              </a:ext>
+            </a:extLst>
+          </p:cNvPr>
+          <p:cNvGrpSpPr/>
+          <p:nvPr/>
+        </p:nvGrpSpPr>
+        <p:grpSpPr>
+          <a:xfrm>
+            <a:off x="3729755" y="3657600"/>
+            <a:ext cx="6767056" cy="3004838"/>
+            <a:chOff x="3729755" y="3657600"/>
+            <a:chExt cx="6767056" cy="3004838"/>
+          </a:xfrm>
+        </p:grpSpPr>
+        <p:pic>
+          <p:nvPicPr>
+            <p:cNvPr id="13" name="Picture 12" descr="A graph of a bar graph&#10;&#10;Description automatically generated">
+              <a:extLst>
+                <a:ext uri="{FF2B5EF4-FFF2-40B4-BE49-F238E27FC236}">
+                  <a16:creationId xmlns:a16="http://schemas.microsoft.com/office/drawing/2014/main" id="{5C9C3E94-9902-B943-CD37-ADD10993C881}"/>
+                </a:ext>
+              </a:extLst>
+            </p:cNvPr>
+            <p:cNvPicPr>
+              <a:picLocks noChangeAspect="1"/>
+            </p:cNvPicPr>
+            <p:nvPr/>
+          </p:nvPicPr>
+          <p:blipFill>
+            <a:blip r:embed="rId4"/>
+            <a:srcRect t="6191" b="3006"/>
+            <a:stretch/>
+          </p:blipFill>
+          <p:spPr>
+            <a:xfrm>
+              <a:off x="8600032" y="3845490"/>
+              <a:ext cx="1896779" cy="2755726"/>
+            </a:xfrm>
+            <a:prstGeom prst="rect">
+              <a:avLst/>
+            </a:prstGeom>
+          </p:spPr>
+        </p:pic>
+        <p:pic>
+          <p:nvPicPr>
+            <p:cNvPr id="3" name="Picture 2" descr="A diagram of a line graph&#10;&#10;Description automatically generated">
+              <a:extLst>
+                <a:ext uri="{FF2B5EF4-FFF2-40B4-BE49-F238E27FC236}">
+                  <a16:creationId xmlns:a16="http://schemas.microsoft.com/office/drawing/2014/main" id="{BDFD5299-8160-F5A4-B74C-4246220144AF}"/>
+                </a:ext>
+              </a:extLst>
+            </p:cNvPr>
+            <p:cNvPicPr>
+              <a:picLocks noChangeAspect="1"/>
+            </p:cNvPicPr>
+            <p:nvPr/>
+          </p:nvPicPr>
+          <p:blipFill>
+            <a:blip r:embed="rId5"/>
+            <a:srcRect r="6670"/>
+            <a:stretch/>
+          </p:blipFill>
+          <p:spPr>
+            <a:xfrm>
+              <a:off x="3729755" y="3657600"/>
+              <a:ext cx="4674016" cy="3004838"/>
             </a:xfrm>
             <a:prstGeom prst="rect">
               <a:avLst/>

</xml_diff>

<commit_message>
update plots with increasing and descending order
</commit_message>
<xml_diff>
--- a/Figure.pptx
+++ b/Figure.pptx
@@ -200,7 +200,7 @@
           <a:p>
             <a:fld id="{B2556B05-391B-8345-83EC-E8E72A5FD6FF}" type="datetimeFigureOut">
               <a:rPr lang="en-US" smtClean="0"/>
-              <a:t>9/7/24</a:t>
+              <a:t>9/10/24</a:t>
             </a:fld>
             <a:endParaRPr lang="en-US"/>
           </a:p>
@@ -701,7 +701,7 @@
           <a:p>
             <a:fld id="{2BF1D306-49A3-A045-9F05-A1AFEEEED0A3}" type="datetimeFigureOut">
               <a:rPr lang="en-US" smtClean="0"/>
-              <a:t>9/7/24</a:t>
+              <a:t>9/10/24</a:t>
             </a:fld>
             <a:endParaRPr lang="en-US"/>
           </a:p>
@@ -899,7 +899,7 @@
           <a:p>
             <a:fld id="{2BF1D306-49A3-A045-9F05-A1AFEEEED0A3}" type="datetimeFigureOut">
               <a:rPr lang="en-US" smtClean="0"/>
-              <a:t>9/7/24</a:t>
+              <a:t>9/10/24</a:t>
             </a:fld>
             <a:endParaRPr lang="en-US"/>
           </a:p>
@@ -1107,7 +1107,7 @@
           <a:p>
             <a:fld id="{2BF1D306-49A3-A045-9F05-A1AFEEEED0A3}" type="datetimeFigureOut">
               <a:rPr lang="en-US" smtClean="0"/>
-              <a:t>9/7/24</a:t>
+              <a:t>9/10/24</a:t>
             </a:fld>
             <a:endParaRPr lang="en-US"/>
           </a:p>
@@ -1305,7 +1305,7 @@
           <a:p>
             <a:fld id="{2BF1D306-49A3-A045-9F05-A1AFEEEED0A3}" type="datetimeFigureOut">
               <a:rPr lang="en-US" smtClean="0"/>
-              <a:t>9/7/24</a:t>
+              <a:t>9/10/24</a:t>
             </a:fld>
             <a:endParaRPr lang="en-US"/>
           </a:p>
@@ -1580,7 +1580,7 @@
           <a:p>
             <a:fld id="{2BF1D306-49A3-A045-9F05-A1AFEEEED0A3}" type="datetimeFigureOut">
               <a:rPr lang="en-US" smtClean="0"/>
-              <a:t>9/7/24</a:t>
+              <a:t>9/10/24</a:t>
             </a:fld>
             <a:endParaRPr lang="en-US"/>
           </a:p>
@@ -1845,7 +1845,7 @@
           <a:p>
             <a:fld id="{2BF1D306-49A3-A045-9F05-A1AFEEEED0A3}" type="datetimeFigureOut">
               <a:rPr lang="en-US" smtClean="0"/>
-              <a:t>9/7/24</a:t>
+              <a:t>9/10/24</a:t>
             </a:fld>
             <a:endParaRPr lang="en-US"/>
           </a:p>
@@ -2257,7 +2257,7 @@
           <a:p>
             <a:fld id="{2BF1D306-49A3-A045-9F05-A1AFEEEED0A3}" type="datetimeFigureOut">
               <a:rPr lang="en-US" smtClean="0"/>
-              <a:t>9/7/24</a:t>
+              <a:t>9/10/24</a:t>
             </a:fld>
             <a:endParaRPr lang="en-US"/>
           </a:p>
@@ -2398,7 +2398,7 @@
           <a:p>
             <a:fld id="{2BF1D306-49A3-A045-9F05-A1AFEEEED0A3}" type="datetimeFigureOut">
               <a:rPr lang="en-US" smtClean="0"/>
-              <a:t>9/7/24</a:t>
+              <a:t>9/10/24</a:t>
             </a:fld>
             <a:endParaRPr lang="en-US"/>
           </a:p>
@@ -2511,7 +2511,7 @@
           <a:p>
             <a:fld id="{2BF1D306-49A3-A045-9F05-A1AFEEEED0A3}" type="datetimeFigureOut">
               <a:rPr lang="en-US" smtClean="0"/>
-              <a:t>9/7/24</a:t>
+              <a:t>9/10/24</a:t>
             </a:fld>
             <a:endParaRPr lang="en-US"/>
           </a:p>
@@ -2822,7 +2822,7 @@
           <a:p>
             <a:fld id="{2BF1D306-49A3-A045-9F05-A1AFEEEED0A3}" type="datetimeFigureOut">
               <a:rPr lang="en-US" smtClean="0"/>
-              <a:t>9/7/24</a:t>
+              <a:t>9/10/24</a:t>
             </a:fld>
             <a:endParaRPr lang="en-US"/>
           </a:p>
@@ -3110,7 +3110,7 @@
           <a:p>
             <a:fld id="{2BF1D306-49A3-A045-9F05-A1AFEEEED0A3}" type="datetimeFigureOut">
               <a:rPr lang="en-US" smtClean="0"/>
-              <a:t>9/7/24</a:t>
+              <a:t>9/10/24</a:t>
             </a:fld>
             <a:endParaRPr lang="en-US"/>
           </a:p>
@@ -3351,7 +3351,7 @@
           <a:p>
             <a:fld id="{2BF1D306-49A3-A045-9F05-A1AFEEEED0A3}" type="datetimeFigureOut">
               <a:rPr lang="en-US" smtClean="0"/>
-              <a:t>9/7/24</a:t>
+              <a:t>9/10/24</a:t>
             </a:fld>
             <a:endParaRPr lang="en-US"/>
           </a:p>
@@ -4991,165 +4991,93 @@
           <a:chExt cx="0" cy="0"/>
         </a:xfrm>
       </p:grpSpPr>
-      <p:grpSp>
-        <p:nvGrpSpPr>
-          <p:cNvPr id="20" name="Group 19">
-            <a:extLst>
-              <a:ext uri="{FF2B5EF4-FFF2-40B4-BE49-F238E27FC236}">
-                <a16:creationId xmlns:a16="http://schemas.microsoft.com/office/drawing/2014/main" id="{7C25AD8A-3C59-B82C-DF43-B495FA42D6CA}"/>
-              </a:ext>
-            </a:extLst>
-          </p:cNvPr>
-          <p:cNvGrpSpPr/>
+      <p:pic>
+        <p:nvPicPr>
+          <p:cNvPr id="19" name="Picture 18" descr="A graph of a bar chart&#10;&#10;Description automatically generated with medium confidence">
+            <a:extLst>
+              <a:ext uri="{FF2B5EF4-FFF2-40B4-BE49-F238E27FC236}">
+                <a16:creationId xmlns:a16="http://schemas.microsoft.com/office/drawing/2014/main" id="{9FB50348-B58A-65C8-2CC0-EC16F5A68745}"/>
+              </a:ext>
+            </a:extLst>
+          </p:cNvPr>
+          <p:cNvPicPr>
+            <a:picLocks noChangeAspect="1"/>
+          </p:cNvPicPr>
           <p:nvPr/>
-        </p:nvGrpSpPr>
-        <p:grpSpPr>
+        </p:nvPicPr>
+        <p:blipFill>
+          <a:blip r:embed="rId2"/>
+          <a:srcRect t="8320" b="3766"/>
+          <a:stretch/>
+        </p:blipFill>
+        <p:spPr>
           <a:xfrm>
-            <a:off x="3606911" y="749682"/>
-            <a:ext cx="6889900" cy="3014389"/>
-            <a:chOff x="3606911" y="749682"/>
-            <a:chExt cx="6889900" cy="3014389"/>
+            <a:off x="5877101" y="1249202"/>
+            <a:ext cx="1632043" cy="2295663"/>
           </a:xfrm>
-        </p:grpSpPr>
-        <p:pic>
-          <p:nvPicPr>
-            <p:cNvPr id="17" name="Picture 16" descr="A diagram of a bar chart&#10;&#10;Description automatically generated">
-              <a:extLst>
-                <a:ext uri="{FF2B5EF4-FFF2-40B4-BE49-F238E27FC236}">
-                  <a16:creationId xmlns:a16="http://schemas.microsoft.com/office/drawing/2014/main" id="{CAD06410-2D85-6DBE-2519-91F9F494FB89}"/>
-                </a:ext>
-              </a:extLst>
-            </p:cNvPr>
-            <p:cNvPicPr>
-              <a:picLocks noChangeAspect="1"/>
-            </p:cNvPicPr>
-            <p:nvPr/>
-          </p:nvPicPr>
-          <p:blipFill>
-            <a:blip r:embed="rId2"/>
-            <a:stretch>
-              <a:fillRect/>
-            </a:stretch>
-          </p:blipFill>
-          <p:spPr>
-            <a:xfrm>
-              <a:off x="3606911" y="749682"/>
-              <a:ext cx="5023982" cy="3014389"/>
-            </a:xfrm>
-            <a:prstGeom prst="rect">
-              <a:avLst/>
-            </a:prstGeom>
-          </p:spPr>
-        </p:pic>
-        <p:pic>
-          <p:nvPicPr>
-            <p:cNvPr id="19" name="Picture 18" descr="A graph of a bar chart&#10;&#10;Description automatically generated with medium confidence">
-              <a:extLst>
-                <a:ext uri="{FF2B5EF4-FFF2-40B4-BE49-F238E27FC236}">
-                  <a16:creationId xmlns:a16="http://schemas.microsoft.com/office/drawing/2014/main" id="{9FB50348-B58A-65C8-2CC0-EC16F5A68745}"/>
-                </a:ext>
-              </a:extLst>
-            </p:cNvPr>
-            <p:cNvPicPr>
-              <a:picLocks noChangeAspect="1"/>
-            </p:cNvPicPr>
-            <p:nvPr/>
-          </p:nvPicPr>
-          <p:blipFill>
-            <a:blip r:embed="rId3"/>
-            <a:srcRect t="8320" b="3766"/>
-            <a:stretch/>
-          </p:blipFill>
-          <p:spPr>
-            <a:xfrm>
-              <a:off x="8600033" y="989556"/>
-              <a:ext cx="1896778" cy="2668044"/>
-            </a:xfrm>
-            <a:prstGeom prst="rect">
-              <a:avLst/>
-            </a:prstGeom>
-          </p:spPr>
-        </p:pic>
-      </p:grpSp>
-      <p:grpSp>
-        <p:nvGrpSpPr>
-          <p:cNvPr id="4" name="Group 3">
-            <a:extLst>
-              <a:ext uri="{FF2B5EF4-FFF2-40B4-BE49-F238E27FC236}">
-                <a16:creationId xmlns:a16="http://schemas.microsoft.com/office/drawing/2014/main" id="{500F12AE-C202-8995-2296-47C993A4A531}"/>
-              </a:ext>
-            </a:extLst>
-          </p:cNvPr>
-          <p:cNvGrpSpPr/>
+          <a:prstGeom prst="rect">
+            <a:avLst/>
+          </a:prstGeom>
+        </p:spPr>
+      </p:pic>
+      <p:pic>
+        <p:nvPicPr>
+          <p:cNvPr id="13" name="Picture 12" descr="A graph of a bar graph&#10;&#10;Description automatically generated">
+            <a:extLst>
+              <a:ext uri="{FF2B5EF4-FFF2-40B4-BE49-F238E27FC236}">
+                <a16:creationId xmlns:a16="http://schemas.microsoft.com/office/drawing/2014/main" id="{5C9C3E94-9902-B943-CD37-ADD10993C881}"/>
+              </a:ext>
+            </a:extLst>
+          </p:cNvPr>
+          <p:cNvPicPr>
+            <a:picLocks noChangeAspect="1"/>
+          </p:cNvPicPr>
           <p:nvPr/>
-        </p:nvGrpSpPr>
-        <p:grpSpPr>
+        </p:nvPicPr>
+        <p:blipFill>
+          <a:blip r:embed="rId3"/>
+          <a:srcRect t="6191" b="3006"/>
+          <a:stretch/>
+        </p:blipFill>
+        <p:spPr>
           <a:xfrm>
-            <a:off x="3729755" y="3657600"/>
-            <a:ext cx="6767056" cy="3004838"/>
-            <a:chOff x="3729755" y="3657600"/>
-            <a:chExt cx="6767056" cy="3004838"/>
+            <a:off x="7788330" y="1187669"/>
+            <a:ext cx="1636937" cy="2378216"/>
           </a:xfrm>
-        </p:grpSpPr>
-        <p:pic>
-          <p:nvPicPr>
-            <p:cNvPr id="13" name="Picture 12" descr="A graph of a bar graph&#10;&#10;Description automatically generated">
-              <a:extLst>
-                <a:ext uri="{FF2B5EF4-FFF2-40B4-BE49-F238E27FC236}">
-                  <a16:creationId xmlns:a16="http://schemas.microsoft.com/office/drawing/2014/main" id="{5C9C3E94-9902-B943-CD37-ADD10993C881}"/>
-                </a:ext>
-              </a:extLst>
-            </p:cNvPr>
-            <p:cNvPicPr>
-              <a:picLocks noChangeAspect="1"/>
-            </p:cNvPicPr>
-            <p:nvPr/>
-          </p:nvPicPr>
-          <p:blipFill>
-            <a:blip r:embed="rId4"/>
-            <a:srcRect t="6191" b="3006"/>
-            <a:stretch/>
-          </p:blipFill>
-          <p:spPr>
-            <a:xfrm>
-              <a:off x="8600032" y="3845490"/>
-              <a:ext cx="1896779" cy="2755726"/>
-            </a:xfrm>
-            <a:prstGeom prst="rect">
-              <a:avLst/>
-            </a:prstGeom>
-          </p:spPr>
-        </p:pic>
-        <p:pic>
-          <p:nvPicPr>
-            <p:cNvPr id="3" name="Picture 2" descr="A diagram of a line graph&#10;&#10;Description automatically generated">
-              <a:extLst>
-                <a:ext uri="{FF2B5EF4-FFF2-40B4-BE49-F238E27FC236}">
-                  <a16:creationId xmlns:a16="http://schemas.microsoft.com/office/drawing/2014/main" id="{BDFD5299-8160-F5A4-B74C-4246220144AF}"/>
-                </a:ext>
-              </a:extLst>
-            </p:cNvPr>
-            <p:cNvPicPr>
-              <a:picLocks noChangeAspect="1"/>
-            </p:cNvPicPr>
-            <p:nvPr/>
-          </p:nvPicPr>
-          <p:blipFill>
-            <a:blip r:embed="rId5"/>
-            <a:srcRect r="6670"/>
-            <a:stretch/>
-          </p:blipFill>
-          <p:spPr>
-            <a:xfrm>
-              <a:off x="3729755" y="3657600"/>
-              <a:ext cx="4674016" cy="3004838"/>
-            </a:xfrm>
-            <a:prstGeom prst="rect">
-              <a:avLst/>
-            </a:prstGeom>
-          </p:spPr>
-        </p:pic>
-      </p:grpSp>
+          <a:prstGeom prst="rect">
+            <a:avLst/>
+          </a:prstGeom>
+        </p:spPr>
+      </p:pic>
+      <p:pic>
+        <p:nvPicPr>
+          <p:cNvPr id="3" name="Picture 2" descr="A diagram of a line graph&#10;&#10;Description automatically generated">
+            <a:extLst>
+              <a:ext uri="{FF2B5EF4-FFF2-40B4-BE49-F238E27FC236}">
+                <a16:creationId xmlns:a16="http://schemas.microsoft.com/office/drawing/2014/main" id="{BDFD5299-8160-F5A4-B74C-4246220144AF}"/>
+              </a:ext>
+            </a:extLst>
+          </p:cNvPr>
+          <p:cNvPicPr>
+            <a:picLocks noChangeAspect="1"/>
+          </p:cNvPicPr>
+          <p:nvPr/>
+        </p:nvPicPr>
+        <p:blipFill>
+          <a:blip r:embed="rId4"/>
+          <a:srcRect r="6670"/>
+          <a:stretch/>
+        </p:blipFill>
+        <p:spPr>
+          <a:xfrm>
+            <a:off x="1161919" y="652762"/>
+            <a:ext cx="4674016" cy="3004838"/>
+          </a:xfrm>
+          <a:prstGeom prst="rect">
+            <a:avLst/>
+          </a:prstGeom>
+        </p:spPr>
+      </p:pic>
     </p:spTree>
     <p:extLst>
       <p:ext uri="{BB962C8B-B14F-4D97-AF65-F5344CB8AC3E}">

</xml_diff>

<commit_message>
update figures and tests
</commit_message>
<xml_diff>
--- a/Figure.pptx
+++ b/Figure.pptx
@@ -200,7 +200,7 @@
           <a:p>
             <a:fld id="{B2556B05-391B-8345-83EC-E8E72A5FD6FF}" type="datetimeFigureOut">
               <a:rPr lang="en-US" smtClean="0"/>
-              <a:t>9/10/24</a:t>
+              <a:t>9/12/24</a:t>
             </a:fld>
             <a:endParaRPr lang="en-US"/>
           </a:p>
@@ -701,7 +701,7 @@
           <a:p>
             <a:fld id="{2BF1D306-49A3-A045-9F05-A1AFEEEED0A3}" type="datetimeFigureOut">
               <a:rPr lang="en-US" smtClean="0"/>
-              <a:t>9/10/24</a:t>
+              <a:t>9/12/24</a:t>
             </a:fld>
             <a:endParaRPr lang="en-US"/>
           </a:p>
@@ -899,7 +899,7 @@
           <a:p>
             <a:fld id="{2BF1D306-49A3-A045-9F05-A1AFEEEED0A3}" type="datetimeFigureOut">
               <a:rPr lang="en-US" smtClean="0"/>
-              <a:t>9/10/24</a:t>
+              <a:t>9/12/24</a:t>
             </a:fld>
             <a:endParaRPr lang="en-US"/>
           </a:p>
@@ -1107,7 +1107,7 @@
           <a:p>
             <a:fld id="{2BF1D306-49A3-A045-9F05-A1AFEEEED0A3}" type="datetimeFigureOut">
               <a:rPr lang="en-US" smtClean="0"/>
-              <a:t>9/10/24</a:t>
+              <a:t>9/12/24</a:t>
             </a:fld>
             <a:endParaRPr lang="en-US"/>
           </a:p>
@@ -1305,7 +1305,7 @@
           <a:p>
             <a:fld id="{2BF1D306-49A3-A045-9F05-A1AFEEEED0A3}" type="datetimeFigureOut">
               <a:rPr lang="en-US" smtClean="0"/>
-              <a:t>9/10/24</a:t>
+              <a:t>9/12/24</a:t>
             </a:fld>
             <a:endParaRPr lang="en-US"/>
           </a:p>
@@ -1580,7 +1580,7 @@
           <a:p>
             <a:fld id="{2BF1D306-49A3-A045-9F05-A1AFEEEED0A3}" type="datetimeFigureOut">
               <a:rPr lang="en-US" smtClean="0"/>
-              <a:t>9/10/24</a:t>
+              <a:t>9/12/24</a:t>
             </a:fld>
             <a:endParaRPr lang="en-US"/>
           </a:p>
@@ -1845,7 +1845,7 @@
           <a:p>
             <a:fld id="{2BF1D306-49A3-A045-9F05-A1AFEEEED0A3}" type="datetimeFigureOut">
               <a:rPr lang="en-US" smtClean="0"/>
-              <a:t>9/10/24</a:t>
+              <a:t>9/12/24</a:t>
             </a:fld>
             <a:endParaRPr lang="en-US"/>
           </a:p>
@@ -2257,7 +2257,7 @@
           <a:p>
             <a:fld id="{2BF1D306-49A3-A045-9F05-A1AFEEEED0A3}" type="datetimeFigureOut">
               <a:rPr lang="en-US" smtClean="0"/>
-              <a:t>9/10/24</a:t>
+              <a:t>9/12/24</a:t>
             </a:fld>
             <a:endParaRPr lang="en-US"/>
           </a:p>
@@ -2398,7 +2398,7 @@
           <a:p>
             <a:fld id="{2BF1D306-49A3-A045-9F05-A1AFEEEED0A3}" type="datetimeFigureOut">
               <a:rPr lang="en-US" smtClean="0"/>
-              <a:t>9/10/24</a:t>
+              <a:t>9/12/24</a:t>
             </a:fld>
             <a:endParaRPr lang="en-US"/>
           </a:p>
@@ -2511,7 +2511,7 @@
           <a:p>
             <a:fld id="{2BF1D306-49A3-A045-9F05-A1AFEEEED0A3}" type="datetimeFigureOut">
               <a:rPr lang="en-US" smtClean="0"/>
-              <a:t>9/10/24</a:t>
+              <a:t>9/12/24</a:t>
             </a:fld>
             <a:endParaRPr lang="en-US"/>
           </a:p>
@@ -2822,7 +2822,7 @@
           <a:p>
             <a:fld id="{2BF1D306-49A3-A045-9F05-A1AFEEEED0A3}" type="datetimeFigureOut">
               <a:rPr lang="en-US" smtClean="0"/>
-              <a:t>9/10/24</a:t>
+              <a:t>9/12/24</a:t>
             </a:fld>
             <a:endParaRPr lang="en-US"/>
           </a:p>
@@ -3110,7 +3110,7 @@
           <a:p>
             <a:fld id="{2BF1D306-49A3-A045-9F05-A1AFEEEED0A3}" type="datetimeFigureOut">
               <a:rPr lang="en-US" smtClean="0"/>
-              <a:t>9/10/24</a:t>
+              <a:t>9/12/24</a:t>
             </a:fld>
             <a:endParaRPr lang="en-US"/>
           </a:p>
@@ -3351,7 +3351,7 @@
           <a:p>
             <a:fld id="{2BF1D306-49A3-A045-9F05-A1AFEEEED0A3}" type="datetimeFigureOut">
               <a:rPr lang="en-US" smtClean="0"/>
-              <a:t>9/10/24</a:t>
+              <a:t>9/12/24</a:t>
             </a:fld>
             <a:endParaRPr lang="en-US"/>
           </a:p>
@@ -4993,10 +4993,10 @@
       </p:grpSpPr>
       <p:grpSp>
         <p:nvGrpSpPr>
-          <p:cNvPr id="31" name="Group 30">
-            <a:extLst>
-              <a:ext uri="{FF2B5EF4-FFF2-40B4-BE49-F238E27FC236}">
-                <a16:creationId xmlns:a16="http://schemas.microsoft.com/office/drawing/2014/main" id="{3E5554AD-4352-A114-421A-D85891ED4660}"/>
+          <p:cNvPr id="33" name="Group 32">
+            <a:extLst>
+              <a:ext uri="{FF2B5EF4-FFF2-40B4-BE49-F238E27FC236}">
+                <a16:creationId xmlns:a16="http://schemas.microsoft.com/office/drawing/2014/main" id="{FA84C297-ADC1-316D-BEA2-3B43C7ABAD5E}"/>
               </a:ext>
             </a:extLst>
           </p:cNvPr>
@@ -5005,47 +5005,18 @@
         </p:nvGrpSpPr>
         <p:grpSpPr>
           <a:xfrm>
-            <a:off x="1199215" y="861848"/>
-            <a:ext cx="8472563" cy="3004838"/>
-            <a:chOff x="1199215" y="861848"/>
-            <a:chExt cx="8472563" cy="3004838"/>
+            <a:off x="1317171" y="819930"/>
+            <a:ext cx="8517893" cy="3046756"/>
+            <a:chOff x="1317171" y="819930"/>
+            <a:chExt cx="8517893" cy="3046756"/>
           </a:xfrm>
         </p:grpSpPr>
-        <p:pic>
-          <p:nvPicPr>
-            <p:cNvPr id="3" name="Picture 2" descr="A diagram of a line graph&#10;&#10;Description automatically generated">
+        <p:grpSp>
+          <p:nvGrpSpPr>
+            <p:cNvPr id="13" name="Group 12">
               <a:extLst>
                 <a:ext uri="{FF2B5EF4-FFF2-40B4-BE49-F238E27FC236}">
-                  <a16:creationId xmlns:a16="http://schemas.microsoft.com/office/drawing/2014/main" id="{BDFD5299-8160-F5A4-B74C-4246220144AF}"/>
-                </a:ext>
-              </a:extLst>
-            </p:cNvPr>
-            <p:cNvPicPr>
-              <a:picLocks noChangeAspect="1"/>
-            </p:cNvPicPr>
-            <p:nvPr/>
-          </p:nvPicPr>
-          <p:blipFill>
-            <a:blip r:embed="rId2"/>
-            <a:srcRect r="6670"/>
-            <a:stretch/>
-          </p:blipFill>
-          <p:spPr>
-            <a:xfrm>
-              <a:off x="1199215" y="861848"/>
-              <a:ext cx="4674016" cy="3004838"/>
-            </a:xfrm>
-            <a:prstGeom prst="rect">
-              <a:avLst/>
-            </a:prstGeom>
-          </p:spPr>
-        </p:pic>
-        <p:grpSp>
-          <p:nvGrpSpPr>
-            <p:cNvPr id="30" name="Group 29">
-              <a:extLst>
-                <a:ext uri="{FF2B5EF4-FFF2-40B4-BE49-F238E27FC236}">
-                  <a16:creationId xmlns:a16="http://schemas.microsoft.com/office/drawing/2014/main" id="{4ADD0162-C118-E75B-1DAE-4EC4C45B313F}"/>
+                  <a16:creationId xmlns:a16="http://schemas.microsoft.com/office/drawing/2014/main" id="{4F89E728-FF86-71AA-D1E7-B2367A29B7E7}"/>
                 </a:ext>
               </a:extLst>
             </p:cNvPr>
@@ -5054,10 +5025,10 @@
           </p:nvGrpSpPr>
           <p:grpSpPr>
             <a:xfrm>
-              <a:off x="2215662" y="861848"/>
-              <a:ext cx="7456116" cy="3001824"/>
-              <a:chOff x="2215662" y="861848"/>
-              <a:chExt cx="7456116" cy="3001824"/>
+              <a:off x="7920164" y="861848"/>
+              <a:ext cx="1914900" cy="3001824"/>
+              <a:chOff x="7756878" y="861848"/>
+              <a:chExt cx="1914900" cy="3001824"/>
             </a:xfrm>
           </p:grpSpPr>
           <p:pic>
@@ -5075,7 +5046,7 @@
               <p:nvPr/>
             </p:nvPicPr>
             <p:blipFill>
-              <a:blip r:embed="rId3"/>
+              <a:blip r:embed="rId2"/>
               <a:stretch>
                 <a:fillRect/>
               </a:stretch>
@@ -5090,6 +5061,487 @@
               </a:prstGeom>
             </p:spPr>
           </p:pic>
+          <p:sp>
+            <p:nvSpPr>
+              <p:cNvPr id="18" name="TextBox 17">
+                <a:extLst>
+                  <a:ext uri="{FF2B5EF4-FFF2-40B4-BE49-F238E27FC236}">
+                    <a16:creationId xmlns:a16="http://schemas.microsoft.com/office/drawing/2014/main" id="{5EAF1D89-90E9-AA7C-AEDD-E53959077589}"/>
+                  </a:ext>
+                </a:extLst>
+              </p:cNvPr>
+              <p:cNvSpPr txBox="1"/>
+              <p:nvPr/>
+            </p:nvSpPr>
+            <p:spPr>
+              <a:xfrm>
+                <a:off x="8228230" y="1634439"/>
+                <a:ext cx="415498" cy="369332"/>
+              </a:xfrm>
+              <a:prstGeom prst="rect">
+                <a:avLst/>
+              </a:prstGeom>
+              <a:noFill/>
+            </p:spPr>
+            <p:txBody>
+              <a:bodyPr wrap="none" rtlCol="0">
+                <a:spAutoFit/>
+              </a:bodyPr>
+              <a:lstStyle/>
+              <a:p>
+                <a:r>
+                  <a:rPr lang="en-US" dirty="0"/>
+                  <a:t>🇫🇷</a:t>
+                </a:r>
+              </a:p>
+            </p:txBody>
+          </p:sp>
+          <p:sp>
+            <p:nvSpPr>
+              <p:cNvPr id="21" name="TextBox 20">
+                <a:extLst>
+                  <a:ext uri="{FF2B5EF4-FFF2-40B4-BE49-F238E27FC236}">
+                    <a16:creationId xmlns:a16="http://schemas.microsoft.com/office/drawing/2014/main" id="{352ADA55-3EF0-618E-E627-7E343CCBCB19}"/>
+                  </a:ext>
+                </a:extLst>
+              </p:cNvPr>
+              <p:cNvSpPr txBox="1"/>
+              <p:nvPr/>
+            </p:nvSpPr>
+            <p:spPr>
+              <a:xfrm>
+                <a:off x="9056511" y="1881194"/>
+                <a:ext cx="415498" cy="369332"/>
+              </a:xfrm>
+              <a:prstGeom prst="rect">
+                <a:avLst/>
+              </a:prstGeom>
+              <a:noFill/>
+            </p:spPr>
+            <p:txBody>
+              <a:bodyPr wrap="none" rtlCol="0">
+                <a:spAutoFit/>
+              </a:bodyPr>
+              <a:lstStyle/>
+              <a:p>
+                <a:r>
+                  <a:rPr lang="en-US" dirty="0"/>
+                  <a:t>🇵🇹</a:t>
+                </a:r>
+              </a:p>
+            </p:txBody>
+          </p:sp>
+          <p:sp>
+            <p:nvSpPr>
+              <p:cNvPr id="22" name="TextBox 21">
+                <a:extLst>
+                  <a:ext uri="{FF2B5EF4-FFF2-40B4-BE49-F238E27FC236}">
+                    <a16:creationId xmlns:a16="http://schemas.microsoft.com/office/drawing/2014/main" id="{A0958359-8F3E-698B-46E0-92A2E67BBD82}"/>
+                  </a:ext>
+                </a:extLst>
+              </p:cNvPr>
+              <p:cNvSpPr txBox="1"/>
+              <p:nvPr/>
+            </p:nvSpPr>
+            <p:spPr>
+              <a:xfrm>
+                <a:off x="8778808" y="1741680"/>
+                <a:ext cx="415498" cy="369332"/>
+              </a:xfrm>
+              <a:prstGeom prst="rect">
+                <a:avLst/>
+              </a:prstGeom>
+              <a:noFill/>
+            </p:spPr>
+            <p:txBody>
+              <a:bodyPr wrap="none" rtlCol="0">
+                <a:spAutoFit/>
+              </a:bodyPr>
+              <a:lstStyle/>
+              <a:p>
+                <a:r>
+                  <a:rPr lang="en-US" dirty="0"/>
+                  <a:t>🇮🇹</a:t>
+                </a:r>
+              </a:p>
+            </p:txBody>
+          </p:sp>
+          <p:sp>
+            <p:nvSpPr>
+              <p:cNvPr id="23" name="TextBox 22">
+                <a:extLst>
+                  <a:ext uri="{FF2B5EF4-FFF2-40B4-BE49-F238E27FC236}">
+                    <a16:creationId xmlns:a16="http://schemas.microsoft.com/office/drawing/2014/main" id="{D24E6C59-33AF-EA76-2DE0-A3F6F39A194A}"/>
+                  </a:ext>
+                </a:extLst>
+              </p:cNvPr>
+              <p:cNvSpPr txBox="1"/>
+              <p:nvPr/>
+            </p:nvSpPr>
+            <p:spPr>
+              <a:xfrm>
+                <a:off x="8504559" y="1696528"/>
+                <a:ext cx="415498" cy="369332"/>
+              </a:xfrm>
+              <a:prstGeom prst="rect">
+                <a:avLst/>
+              </a:prstGeom>
+              <a:noFill/>
+            </p:spPr>
+            <p:txBody>
+              <a:bodyPr wrap="none" rtlCol="0">
+                <a:spAutoFit/>
+              </a:bodyPr>
+              <a:lstStyle/>
+              <a:p>
+                <a:r>
+                  <a:rPr lang="en-US" dirty="0"/>
+                  <a:t>🇪🇸</a:t>
+                </a:r>
+              </a:p>
+            </p:txBody>
+          </p:sp>
+          <p:sp>
+            <p:nvSpPr>
+              <p:cNvPr id="26" name="Rectangle 25">
+                <a:extLst>
+                  <a:ext uri="{FF2B5EF4-FFF2-40B4-BE49-F238E27FC236}">
+                    <a16:creationId xmlns:a16="http://schemas.microsoft.com/office/drawing/2014/main" id="{B8DE3BE6-039A-516B-0365-62A5CE425D02}"/>
+                  </a:ext>
+                </a:extLst>
+              </p:cNvPr>
+              <p:cNvSpPr/>
+              <p:nvPr/>
+            </p:nvSpPr>
+            <p:spPr>
+              <a:xfrm>
+                <a:off x="7803939" y="1045859"/>
+                <a:ext cx="1844887" cy="163696"/>
+              </a:xfrm>
+              <a:prstGeom prst="rect">
+                <a:avLst/>
+              </a:prstGeom>
+              <a:solidFill>
+                <a:schemeClr val="bg1"/>
+              </a:solidFill>
+              <a:ln>
+                <a:noFill/>
+              </a:ln>
+            </p:spPr>
+            <p:style>
+              <a:lnRef idx="2">
+                <a:schemeClr val="accent1">
+                  <a:shade val="15000"/>
+                </a:schemeClr>
+              </a:lnRef>
+              <a:fillRef idx="1">
+                <a:schemeClr val="accent1"/>
+              </a:fillRef>
+              <a:effectRef idx="0">
+                <a:schemeClr val="accent1"/>
+              </a:effectRef>
+              <a:fontRef idx="minor">
+                <a:schemeClr val="lt1"/>
+              </a:fontRef>
+            </p:style>
+            <p:txBody>
+              <a:bodyPr rtlCol="0" anchor="ctr"/>
+              <a:lstStyle/>
+              <a:p>
+                <a:pPr algn="ctr"/>
+                <a:r>
+                  <a:rPr lang="en-US" dirty="0"/>
+                  <a:t>v</a:t>
+                </a:r>
+              </a:p>
+            </p:txBody>
+          </p:sp>
+          <p:sp>
+            <p:nvSpPr>
+              <p:cNvPr id="27" name="TextBox 26">
+                <a:extLst>
+                  <a:ext uri="{FF2B5EF4-FFF2-40B4-BE49-F238E27FC236}">
+                    <a16:creationId xmlns:a16="http://schemas.microsoft.com/office/drawing/2014/main" id="{321D35A7-876C-430A-DB0B-B58038F2099A}"/>
+                  </a:ext>
+                </a:extLst>
+              </p:cNvPr>
+              <p:cNvSpPr txBox="1"/>
+              <p:nvPr/>
+            </p:nvSpPr>
+            <p:spPr>
+              <a:xfrm>
+                <a:off x="7763883" y="881486"/>
+                <a:ext cx="1907895" cy="246221"/>
+              </a:xfrm>
+              <a:prstGeom prst="rect">
+                <a:avLst/>
+              </a:prstGeom>
+              <a:noFill/>
+            </p:spPr>
+            <p:txBody>
+              <a:bodyPr wrap="none" rtlCol="0">
+                <a:spAutoFit/>
+              </a:bodyPr>
+              <a:lstStyle/>
+              <a:p>
+                <a:r>
+                  <a:rPr lang="en-US" sz="1000" dirty="0">
+                    <a:latin typeface="Calibri" panose="020F0502020204030204" pitchFamily="34" charset="0"/>
+                    <a:cs typeface="Calibri" panose="020F0502020204030204" pitchFamily="34" charset="0"/>
+                  </a:rPr>
+                  <a:t>Wine Price-Rating breaking-point</a:t>
+                </a:r>
+              </a:p>
+            </p:txBody>
+          </p:sp>
+          <p:sp>
+            <p:nvSpPr>
+              <p:cNvPr id="10" name="TextBox 9">
+                <a:extLst>
+                  <a:ext uri="{FF2B5EF4-FFF2-40B4-BE49-F238E27FC236}">
+                    <a16:creationId xmlns:a16="http://schemas.microsoft.com/office/drawing/2014/main" id="{21A68471-CA9B-34C5-026F-35F123EB664C}"/>
+                  </a:ext>
+                </a:extLst>
+              </p:cNvPr>
+              <p:cNvSpPr txBox="1"/>
+              <p:nvPr/>
+            </p:nvSpPr>
+            <p:spPr>
+              <a:xfrm>
+                <a:off x="7953024" y="1044215"/>
+                <a:ext cx="254000" cy="369332"/>
+              </a:xfrm>
+              <a:prstGeom prst="rect">
+                <a:avLst/>
+              </a:prstGeom>
+              <a:noFill/>
+            </p:spPr>
+            <p:txBody>
+              <a:bodyPr wrap="square" rtlCol="0">
+                <a:spAutoFit/>
+              </a:bodyPr>
+              <a:lstStyle/>
+              <a:p>
+                <a:r>
+                  <a:rPr lang="en-US" dirty="0"/>
+                  <a:t>🇺🇸</a:t>
+                </a:r>
+              </a:p>
+            </p:txBody>
+          </p:sp>
+        </p:grpSp>
+        <p:grpSp>
+          <p:nvGrpSpPr>
+            <p:cNvPr id="17" name="Group 16">
+              <a:extLst>
+                <a:ext uri="{FF2B5EF4-FFF2-40B4-BE49-F238E27FC236}">
+                  <a16:creationId xmlns:a16="http://schemas.microsoft.com/office/drawing/2014/main" id="{3C333B86-C0AC-E824-BF66-21C9C3F0C39A}"/>
+                </a:ext>
+              </a:extLst>
+            </p:cNvPr>
+            <p:cNvGrpSpPr/>
+            <p:nvPr/>
+          </p:nvGrpSpPr>
+          <p:grpSpPr>
+            <a:xfrm>
+              <a:off x="3082862" y="861848"/>
+              <a:ext cx="4674016" cy="3004838"/>
+              <a:chOff x="1199215" y="861848"/>
+              <a:chExt cx="4674016" cy="3004838"/>
+            </a:xfrm>
+          </p:grpSpPr>
+          <p:pic>
+            <p:nvPicPr>
+              <p:cNvPr id="3" name="Picture 2" descr="A diagram of a line graph&#10;&#10;Description automatically generated">
+                <a:extLst>
+                  <a:ext uri="{FF2B5EF4-FFF2-40B4-BE49-F238E27FC236}">
+                    <a16:creationId xmlns:a16="http://schemas.microsoft.com/office/drawing/2014/main" id="{BDFD5299-8160-F5A4-B74C-4246220144AF}"/>
+                  </a:ext>
+                </a:extLst>
+              </p:cNvPr>
+              <p:cNvPicPr>
+                <a:picLocks noChangeAspect="1"/>
+              </p:cNvPicPr>
+              <p:nvPr/>
+            </p:nvPicPr>
+            <p:blipFill>
+              <a:blip r:embed="rId3"/>
+              <a:srcRect r="6670"/>
+              <a:stretch/>
+            </p:blipFill>
+            <p:spPr>
+              <a:xfrm>
+                <a:off x="1199215" y="861848"/>
+                <a:ext cx="4674016" cy="3004838"/>
+              </a:xfrm>
+              <a:prstGeom prst="rect">
+                <a:avLst/>
+              </a:prstGeom>
+            </p:spPr>
+          </p:pic>
+          <p:sp>
+            <p:nvSpPr>
+              <p:cNvPr id="28" name="Rectangle 27">
+                <a:extLst>
+                  <a:ext uri="{FF2B5EF4-FFF2-40B4-BE49-F238E27FC236}">
+                    <a16:creationId xmlns:a16="http://schemas.microsoft.com/office/drawing/2014/main" id="{4A5FD4A6-BF5D-1274-7926-317AF8757A2F}"/>
+                  </a:ext>
+                </a:extLst>
+              </p:cNvPr>
+              <p:cNvSpPr/>
+              <p:nvPr/>
+            </p:nvSpPr>
+            <p:spPr>
+              <a:xfrm>
+                <a:off x="2215662" y="1056435"/>
+                <a:ext cx="3193724" cy="151476"/>
+              </a:xfrm>
+              <a:prstGeom prst="rect">
+                <a:avLst/>
+              </a:prstGeom>
+              <a:solidFill>
+                <a:schemeClr val="bg1"/>
+              </a:solidFill>
+              <a:ln>
+                <a:noFill/>
+              </a:ln>
+            </p:spPr>
+            <p:style>
+              <a:lnRef idx="2">
+                <a:schemeClr val="accent1">
+                  <a:shade val="15000"/>
+                </a:schemeClr>
+              </a:lnRef>
+              <a:fillRef idx="1">
+                <a:schemeClr val="accent1"/>
+              </a:fillRef>
+              <a:effectRef idx="0">
+                <a:schemeClr val="accent1"/>
+              </a:effectRef>
+              <a:fontRef idx="minor">
+                <a:schemeClr val="lt1"/>
+              </a:fontRef>
+            </p:style>
+            <p:txBody>
+              <a:bodyPr rtlCol="0" anchor="ctr"/>
+              <a:lstStyle/>
+              <a:p>
+                <a:pPr algn="ctr"/>
+                <a:endParaRPr lang="en-US"/>
+              </a:p>
+            </p:txBody>
+          </p:sp>
+          <p:sp>
+            <p:nvSpPr>
+              <p:cNvPr id="29" name="TextBox 28">
+                <a:extLst>
+                  <a:ext uri="{FF2B5EF4-FFF2-40B4-BE49-F238E27FC236}">
+                    <a16:creationId xmlns:a16="http://schemas.microsoft.com/office/drawing/2014/main" id="{27C75E28-A9C6-0ECE-69C6-2E9CC789BB8C}"/>
+                  </a:ext>
+                </a:extLst>
+              </p:cNvPr>
+              <p:cNvSpPr txBox="1"/>
+              <p:nvPr/>
+            </p:nvSpPr>
+            <p:spPr>
+              <a:xfrm>
+                <a:off x="2682052" y="881486"/>
+                <a:ext cx="2358338" cy="253916"/>
+              </a:xfrm>
+              <a:prstGeom prst="rect">
+                <a:avLst/>
+              </a:prstGeom>
+              <a:noFill/>
+            </p:spPr>
+            <p:txBody>
+              <a:bodyPr wrap="none" rtlCol="0">
+                <a:spAutoFit/>
+              </a:bodyPr>
+              <a:lstStyle/>
+              <a:p>
+                <a:r>
+                  <a:rPr lang="en-US" sz="1050" dirty="0">
+                    <a:latin typeface="Calibri" panose="020F0502020204030204" pitchFamily="34" charset="0"/>
+                    <a:cs typeface="Calibri" panose="020F0502020204030204" pitchFamily="34" charset="0"/>
+                  </a:rPr>
+                  <a:t>Linear Regression: Wine Price vs. Rating</a:t>
+                </a:r>
+              </a:p>
+            </p:txBody>
+          </p:sp>
+        </p:grpSp>
+        <p:grpSp>
+          <p:nvGrpSpPr>
+            <p:cNvPr id="8" name="Group 7">
+              <a:extLst>
+                <a:ext uri="{FF2B5EF4-FFF2-40B4-BE49-F238E27FC236}">
+                  <a16:creationId xmlns:a16="http://schemas.microsoft.com/office/drawing/2014/main" id="{D59EB451-1988-6FB1-B5F6-7495C4EE680F}"/>
+                </a:ext>
+              </a:extLst>
+            </p:cNvPr>
+            <p:cNvGrpSpPr/>
+            <p:nvPr/>
+          </p:nvGrpSpPr>
+          <p:grpSpPr>
+            <a:xfrm>
+              <a:off x="1501512" y="861848"/>
+              <a:ext cx="1916196" cy="3001824"/>
+              <a:chOff x="5880738" y="861848"/>
+              <a:chExt cx="1916196" cy="3001824"/>
+            </a:xfrm>
+          </p:grpSpPr>
+          <p:sp>
+            <p:nvSpPr>
+              <p:cNvPr id="25" name="Rectangle 24">
+                <a:extLst>
+                  <a:ext uri="{FF2B5EF4-FFF2-40B4-BE49-F238E27FC236}">
+                    <a16:creationId xmlns:a16="http://schemas.microsoft.com/office/drawing/2014/main" id="{00EE934A-3C95-95F5-3D7D-A0BC6735EE9D}"/>
+                  </a:ext>
+                </a:extLst>
+              </p:cNvPr>
+              <p:cNvSpPr/>
+              <p:nvPr/>
+            </p:nvSpPr>
+            <p:spPr>
+              <a:xfrm>
+                <a:off x="5911991" y="1044215"/>
+                <a:ext cx="1844887" cy="163696"/>
+              </a:xfrm>
+              <a:prstGeom prst="rect">
+                <a:avLst/>
+              </a:prstGeom>
+              <a:solidFill>
+                <a:schemeClr val="bg1"/>
+              </a:solidFill>
+              <a:ln>
+                <a:noFill/>
+              </a:ln>
+            </p:spPr>
+            <p:style>
+              <a:lnRef idx="2">
+                <a:schemeClr val="accent1">
+                  <a:shade val="15000"/>
+                </a:schemeClr>
+              </a:lnRef>
+              <a:fillRef idx="1">
+                <a:schemeClr val="accent1"/>
+              </a:fillRef>
+              <a:effectRef idx="0">
+                <a:schemeClr val="accent1"/>
+              </a:effectRef>
+              <a:fontRef idx="minor">
+                <a:schemeClr val="lt1"/>
+              </a:fontRef>
+            </p:style>
+            <p:txBody>
+              <a:bodyPr rtlCol="0" anchor="ctr"/>
+              <a:lstStyle/>
+              <a:p>
+                <a:pPr algn="ctr"/>
+                <a:endParaRPr lang="en-US"/>
+              </a:p>
+            </p:txBody>
+          </p:sp>
           <p:pic>
             <p:nvPicPr>
               <p:cNvPr id="9" name="Picture 8" descr="A graph of a bar graph&#10;&#10;Description automatically generated with medium confidence">
@@ -5262,150 +5714,10 @@
           </p:sp>
           <p:sp>
             <p:nvSpPr>
-              <p:cNvPr id="18" name="TextBox 17">
+              <p:cNvPr id="6" name="Rectangle 5">
                 <a:extLst>
                   <a:ext uri="{FF2B5EF4-FFF2-40B4-BE49-F238E27FC236}">
-                    <a16:creationId xmlns:a16="http://schemas.microsoft.com/office/drawing/2014/main" id="{5EAF1D89-90E9-AA7C-AEDD-E53959077589}"/>
-                  </a:ext>
-                </a:extLst>
-              </p:cNvPr>
-              <p:cNvSpPr txBox="1"/>
-              <p:nvPr/>
-            </p:nvSpPr>
-            <p:spPr>
-              <a:xfrm>
-                <a:off x="8228230" y="1634439"/>
-                <a:ext cx="415498" cy="369332"/>
-              </a:xfrm>
-              <a:prstGeom prst="rect">
-                <a:avLst/>
-              </a:prstGeom>
-              <a:noFill/>
-            </p:spPr>
-            <p:txBody>
-              <a:bodyPr wrap="none" rtlCol="0">
-                <a:spAutoFit/>
-              </a:bodyPr>
-              <a:lstStyle/>
-              <a:p>
-                <a:r>
-                  <a:rPr lang="en-US" dirty="0"/>
-                  <a:t>🇫🇷</a:t>
-                </a:r>
-              </a:p>
-            </p:txBody>
-          </p:sp>
-          <p:sp>
-            <p:nvSpPr>
-              <p:cNvPr id="21" name="TextBox 20">
-                <a:extLst>
-                  <a:ext uri="{FF2B5EF4-FFF2-40B4-BE49-F238E27FC236}">
-                    <a16:creationId xmlns:a16="http://schemas.microsoft.com/office/drawing/2014/main" id="{352ADA55-3EF0-618E-E627-7E343CCBCB19}"/>
-                  </a:ext>
-                </a:extLst>
-              </p:cNvPr>
-              <p:cNvSpPr txBox="1"/>
-              <p:nvPr/>
-            </p:nvSpPr>
-            <p:spPr>
-              <a:xfrm>
-                <a:off x="9056511" y="1881194"/>
-                <a:ext cx="415498" cy="369332"/>
-              </a:xfrm>
-              <a:prstGeom prst="rect">
-                <a:avLst/>
-              </a:prstGeom>
-              <a:noFill/>
-            </p:spPr>
-            <p:txBody>
-              <a:bodyPr wrap="none" rtlCol="0">
-                <a:spAutoFit/>
-              </a:bodyPr>
-              <a:lstStyle/>
-              <a:p>
-                <a:r>
-                  <a:rPr lang="en-US" dirty="0"/>
-                  <a:t>🇵🇹</a:t>
-                </a:r>
-              </a:p>
-            </p:txBody>
-          </p:sp>
-          <p:sp>
-            <p:nvSpPr>
-              <p:cNvPr id="22" name="TextBox 21">
-                <a:extLst>
-                  <a:ext uri="{FF2B5EF4-FFF2-40B4-BE49-F238E27FC236}">
-                    <a16:creationId xmlns:a16="http://schemas.microsoft.com/office/drawing/2014/main" id="{A0958359-8F3E-698B-46E0-92A2E67BBD82}"/>
-                  </a:ext>
-                </a:extLst>
-              </p:cNvPr>
-              <p:cNvSpPr txBox="1"/>
-              <p:nvPr/>
-            </p:nvSpPr>
-            <p:spPr>
-              <a:xfrm>
-                <a:off x="8778808" y="1741680"/>
-                <a:ext cx="415498" cy="369332"/>
-              </a:xfrm>
-              <a:prstGeom prst="rect">
-                <a:avLst/>
-              </a:prstGeom>
-              <a:noFill/>
-            </p:spPr>
-            <p:txBody>
-              <a:bodyPr wrap="none" rtlCol="0">
-                <a:spAutoFit/>
-              </a:bodyPr>
-              <a:lstStyle/>
-              <a:p>
-                <a:r>
-                  <a:rPr lang="en-US" dirty="0"/>
-                  <a:t>🇮🇹</a:t>
-                </a:r>
-              </a:p>
-            </p:txBody>
-          </p:sp>
-          <p:sp>
-            <p:nvSpPr>
-              <p:cNvPr id="23" name="TextBox 22">
-                <a:extLst>
-                  <a:ext uri="{FF2B5EF4-FFF2-40B4-BE49-F238E27FC236}">
-                    <a16:creationId xmlns:a16="http://schemas.microsoft.com/office/drawing/2014/main" id="{D24E6C59-33AF-EA76-2DE0-A3F6F39A194A}"/>
-                  </a:ext>
-                </a:extLst>
-              </p:cNvPr>
-              <p:cNvSpPr txBox="1"/>
-              <p:nvPr/>
-            </p:nvSpPr>
-            <p:spPr>
-              <a:xfrm>
-                <a:off x="8504559" y="1696528"/>
-                <a:ext cx="415498" cy="369332"/>
-              </a:xfrm>
-              <a:prstGeom prst="rect">
-                <a:avLst/>
-              </a:prstGeom>
-              <a:noFill/>
-            </p:spPr>
-            <p:txBody>
-              <a:bodyPr wrap="none" rtlCol="0">
-                <a:spAutoFit/>
-              </a:bodyPr>
-              <a:lstStyle/>
-              <a:p>
-                <a:r>
-                  <a:rPr lang="en-US" dirty="0"/>
-                  <a:t>🇪🇸</a:t>
-                </a:r>
-              </a:p>
-            </p:txBody>
-          </p:sp>
-          <p:sp>
-            <p:nvSpPr>
-              <p:cNvPr id="25" name="Rectangle 24">
-                <a:extLst>
-                  <a:ext uri="{FF2B5EF4-FFF2-40B4-BE49-F238E27FC236}">
-                    <a16:creationId xmlns:a16="http://schemas.microsoft.com/office/drawing/2014/main" id="{00EE934A-3C95-95F5-3D7D-A0BC6735EE9D}"/>
+                    <a16:creationId xmlns:a16="http://schemas.microsoft.com/office/drawing/2014/main" id="{51FD1895-9B44-BDE5-71DE-8AE3E4FE7180}"/>
                   </a:ext>
                 </a:extLst>
               </p:cNvPr>
@@ -5414,7 +5726,7 @@
             </p:nvSpPr>
             <p:spPr>
               <a:xfrm>
-                <a:off x="5911991" y="1044215"/>
+                <a:off x="5952047" y="1056435"/>
                 <a:ext cx="1844887" cy="163696"/>
               </a:xfrm>
               <a:prstGeom prst="rect">
@@ -5448,7 +5760,10 @@
               <a:lstStyle/>
               <a:p>
                 <a:pPr algn="ctr"/>
-                <a:endParaRPr lang="en-US"/>
+                <a:r>
+                  <a:rPr lang="en-US" dirty="0"/>
+                  <a:t>v</a:t>
+                </a:r>
               </a:p>
             </p:txBody>
           </p:sp>
@@ -5539,222 +5854,113 @@
               </a:p>
             </p:txBody>
           </p:sp>
-          <p:sp>
-            <p:nvSpPr>
-              <p:cNvPr id="26" name="Rectangle 25">
-                <a:extLst>
-                  <a:ext uri="{FF2B5EF4-FFF2-40B4-BE49-F238E27FC236}">
-                    <a16:creationId xmlns:a16="http://schemas.microsoft.com/office/drawing/2014/main" id="{B8DE3BE6-039A-516B-0365-62A5CE425D02}"/>
-                  </a:ext>
-                </a:extLst>
-              </p:cNvPr>
-              <p:cNvSpPr/>
-              <p:nvPr/>
-            </p:nvSpPr>
-            <p:spPr>
-              <a:xfrm>
-                <a:off x="7803939" y="1045859"/>
-                <a:ext cx="1844887" cy="163696"/>
-              </a:xfrm>
-              <a:prstGeom prst="rect">
-                <a:avLst/>
-              </a:prstGeom>
-              <a:solidFill>
-                <a:schemeClr val="bg1"/>
-              </a:solidFill>
-              <a:ln>
-                <a:noFill/>
-              </a:ln>
-            </p:spPr>
-            <p:style>
-              <a:lnRef idx="2">
-                <a:schemeClr val="accent1">
-                  <a:shade val="15000"/>
-                </a:schemeClr>
-              </a:lnRef>
-              <a:fillRef idx="1">
-                <a:schemeClr val="accent1"/>
-              </a:fillRef>
-              <a:effectRef idx="0">
-                <a:schemeClr val="accent1"/>
-              </a:effectRef>
-              <a:fontRef idx="minor">
-                <a:schemeClr val="lt1"/>
-              </a:fontRef>
-            </p:style>
-            <p:txBody>
-              <a:bodyPr rtlCol="0" anchor="ctr"/>
-              <a:lstStyle/>
-              <a:p>
-                <a:pPr algn="ctr"/>
-                <a:endParaRPr lang="en-US"/>
-              </a:p>
-            </p:txBody>
-          </p:sp>
-          <p:sp>
-            <p:nvSpPr>
-              <p:cNvPr id="27" name="TextBox 26">
-                <a:extLst>
-                  <a:ext uri="{FF2B5EF4-FFF2-40B4-BE49-F238E27FC236}">
-                    <a16:creationId xmlns:a16="http://schemas.microsoft.com/office/drawing/2014/main" id="{321D35A7-876C-430A-DB0B-B58038F2099A}"/>
-                  </a:ext>
-                </a:extLst>
-              </p:cNvPr>
-              <p:cNvSpPr txBox="1"/>
-              <p:nvPr/>
-            </p:nvSpPr>
-            <p:spPr>
-              <a:xfrm>
-                <a:off x="7763883" y="881486"/>
-                <a:ext cx="1907895" cy="246221"/>
-              </a:xfrm>
-              <a:prstGeom prst="rect">
-                <a:avLst/>
-              </a:prstGeom>
-              <a:noFill/>
-            </p:spPr>
-            <p:txBody>
-              <a:bodyPr wrap="none" rtlCol="0">
-                <a:spAutoFit/>
-              </a:bodyPr>
-              <a:lstStyle/>
-              <a:p>
-                <a:r>
-                  <a:rPr lang="en-US" sz="1000" dirty="0">
-                    <a:latin typeface="Calibri" panose="020F0502020204030204" pitchFamily="34" charset="0"/>
-                    <a:cs typeface="Calibri" panose="020F0502020204030204" pitchFamily="34" charset="0"/>
-                  </a:rPr>
-                  <a:t>Wine Price-Rating breaking-point</a:t>
-                </a:r>
-              </a:p>
-            </p:txBody>
-          </p:sp>
-          <p:sp>
-            <p:nvSpPr>
-              <p:cNvPr id="10" name="TextBox 9">
-                <a:extLst>
-                  <a:ext uri="{FF2B5EF4-FFF2-40B4-BE49-F238E27FC236}">
-                    <a16:creationId xmlns:a16="http://schemas.microsoft.com/office/drawing/2014/main" id="{21A68471-CA9B-34C5-026F-35F123EB664C}"/>
-                  </a:ext>
-                </a:extLst>
-              </p:cNvPr>
-              <p:cNvSpPr txBox="1"/>
-              <p:nvPr/>
-            </p:nvSpPr>
-            <p:spPr>
-              <a:xfrm>
-                <a:off x="7953024" y="1044215"/>
-                <a:ext cx="254000" cy="369332"/>
-              </a:xfrm>
-              <a:prstGeom prst="rect">
-                <a:avLst/>
-              </a:prstGeom>
-              <a:noFill/>
-            </p:spPr>
-            <p:txBody>
-              <a:bodyPr wrap="square" rtlCol="0">
-                <a:spAutoFit/>
-              </a:bodyPr>
-              <a:lstStyle/>
-              <a:p>
-                <a:r>
-                  <a:rPr lang="en-US" dirty="0"/>
-                  <a:t>🇺🇸</a:t>
-                </a:r>
-              </a:p>
-            </p:txBody>
-          </p:sp>
-          <p:sp>
-            <p:nvSpPr>
-              <p:cNvPr id="28" name="Rectangle 27">
-                <a:extLst>
-                  <a:ext uri="{FF2B5EF4-FFF2-40B4-BE49-F238E27FC236}">
-                    <a16:creationId xmlns:a16="http://schemas.microsoft.com/office/drawing/2014/main" id="{4A5FD4A6-BF5D-1274-7926-317AF8757A2F}"/>
-                  </a:ext>
-                </a:extLst>
-              </p:cNvPr>
-              <p:cNvSpPr/>
-              <p:nvPr/>
-            </p:nvSpPr>
-            <p:spPr>
-              <a:xfrm>
-                <a:off x="2215662" y="1056435"/>
-                <a:ext cx="3193724" cy="151476"/>
-              </a:xfrm>
-              <a:prstGeom prst="rect">
-                <a:avLst/>
-              </a:prstGeom>
-              <a:solidFill>
-                <a:schemeClr val="bg1"/>
-              </a:solidFill>
-              <a:ln>
-                <a:noFill/>
-              </a:ln>
-            </p:spPr>
-            <p:style>
-              <a:lnRef idx="2">
-                <a:schemeClr val="accent1">
-                  <a:shade val="15000"/>
-                </a:schemeClr>
-              </a:lnRef>
-              <a:fillRef idx="1">
-                <a:schemeClr val="accent1"/>
-              </a:fillRef>
-              <a:effectRef idx="0">
-                <a:schemeClr val="accent1"/>
-              </a:effectRef>
-              <a:fontRef idx="minor">
-                <a:schemeClr val="lt1"/>
-              </a:fontRef>
-            </p:style>
-            <p:txBody>
-              <a:bodyPr rtlCol="0" anchor="ctr"/>
-              <a:lstStyle/>
-              <a:p>
-                <a:pPr algn="ctr"/>
-                <a:endParaRPr lang="en-US"/>
-              </a:p>
-            </p:txBody>
-          </p:sp>
-          <p:sp>
-            <p:nvSpPr>
-              <p:cNvPr id="29" name="TextBox 28">
-                <a:extLst>
-                  <a:ext uri="{FF2B5EF4-FFF2-40B4-BE49-F238E27FC236}">
-                    <a16:creationId xmlns:a16="http://schemas.microsoft.com/office/drawing/2014/main" id="{27C75E28-A9C6-0ECE-69C6-2E9CC789BB8C}"/>
-                  </a:ext>
-                </a:extLst>
-              </p:cNvPr>
-              <p:cNvSpPr txBox="1"/>
-              <p:nvPr/>
-            </p:nvSpPr>
-            <p:spPr>
-              <a:xfrm>
-                <a:off x="2682052" y="881486"/>
-                <a:ext cx="2358338" cy="253916"/>
-              </a:xfrm>
-              <a:prstGeom prst="rect">
-                <a:avLst/>
-              </a:prstGeom>
-              <a:noFill/>
-            </p:spPr>
-            <p:txBody>
-              <a:bodyPr wrap="none" rtlCol="0">
-                <a:spAutoFit/>
-              </a:bodyPr>
-              <a:lstStyle/>
-              <a:p>
-                <a:r>
-                  <a:rPr lang="en-US" sz="1050" dirty="0">
-                    <a:latin typeface="Calibri" panose="020F0502020204030204" pitchFamily="34" charset="0"/>
-                    <a:cs typeface="Calibri" panose="020F0502020204030204" pitchFamily="34" charset="0"/>
-                  </a:rPr>
-                  <a:t>Linear Regression: Wine Price vs. Rating</a:t>
-                </a:r>
-              </a:p>
-            </p:txBody>
-          </p:sp>
         </p:grpSp>
+        <p:sp>
+          <p:nvSpPr>
+            <p:cNvPr id="19" name="TextBox 18">
+              <a:extLst>
+                <a:ext uri="{FF2B5EF4-FFF2-40B4-BE49-F238E27FC236}">
+                  <a16:creationId xmlns:a16="http://schemas.microsoft.com/office/drawing/2014/main" id="{4C7A7885-EDA8-06E6-AE65-3E9AF7E1DE1A}"/>
+                </a:ext>
+              </a:extLst>
+            </p:cNvPr>
+            <p:cNvSpPr txBox="1"/>
+            <p:nvPr/>
+          </p:nvSpPr>
+          <p:spPr>
+            <a:xfrm>
+              <a:off x="1317171" y="861848"/>
+              <a:ext cx="327334" cy="369332"/>
+            </a:xfrm>
+            <a:prstGeom prst="rect">
+              <a:avLst/>
+            </a:prstGeom>
+            <a:noFill/>
+          </p:spPr>
+          <p:txBody>
+            <a:bodyPr wrap="none" rtlCol="0">
+              <a:spAutoFit/>
+            </a:bodyPr>
+            <a:lstStyle/>
+            <a:p>
+              <a:r>
+                <a:rPr lang="en-US" b="1"/>
+                <a:t>A</a:t>
+              </a:r>
+            </a:p>
+          </p:txBody>
+        </p:sp>
+        <p:sp>
+          <p:nvSpPr>
+            <p:cNvPr id="20" name="TextBox 19">
+              <a:extLst>
+                <a:ext uri="{FF2B5EF4-FFF2-40B4-BE49-F238E27FC236}">
+                  <a16:creationId xmlns:a16="http://schemas.microsoft.com/office/drawing/2014/main" id="{EF5D076E-41CF-91C8-1358-89A194C48BD6}"/>
+                </a:ext>
+              </a:extLst>
+            </p:cNvPr>
+            <p:cNvSpPr txBox="1"/>
+            <p:nvPr/>
+          </p:nvSpPr>
+          <p:spPr>
+            <a:xfrm>
+              <a:off x="3330701" y="819930"/>
+              <a:ext cx="327334" cy="369332"/>
+            </a:xfrm>
+            <a:prstGeom prst="rect">
+              <a:avLst/>
+            </a:prstGeom>
+            <a:noFill/>
+          </p:spPr>
+          <p:txBody>
+            <a:bodyPr wrap="none" rtlCol="0">
+              <a:spAutoFit/>
+            </a:bodyPr>
+            <a:lstStyle/>
+            <a:p>
+              <a:r>
+                <a:rPr lang="en-US" b="1"/>
+                <a:t>B</a:t>
+              </a:r>
+              <a:endParaRPr lang="en-US" b="1" dirty="0"/>
+            </a:p>
+          </p:txBody>
+        </p:sp>
+        <p:sp>
+          <p:nvSpPr>
+            <p:cNvPr id="32" name="TextBox 31">
+              <a:extLst>
+                <a:ext uri="{FF2B5EF4-FFF2-40B4-BE49-F238E27FC236}">
+                  <a16:creationId xmlns:a16="http://schemas.microsoft.com/office/drawing/2014/main" id="{E5A42267-0485-D30D-B700-B87CEAAB1344}"/>
+                </a:ext>
+              </a:extLst>
+            </p:cNvPr>
+            <p:cNvSpPr txBox="1"/>
+            <p:nvPr/>
+          </p:nvSpPr>
+          <p:spPr>
+            <a:xfrm>
+              <a:off x="7680940" y="826500"/>
+              <a:ext cx="348172" cy="369332"/>
+            </a:xfrm>
+            <a:prstGeom prst="rect">
+              <a:avLst/>
+            </a:prstGeom>
+            <a:noFill/>
+          </p:spPr>
+          <p:txBody>
+            <a:bodyPr wrap="none" rtlCol="0">
+              <a:spAutoFit/>
+            </a:bodyPr>
+            <a:lstStyle/>
+            <a:p>
+              <a:r>
+                <a:rPr lang="en-US" b="1" dirty="0"/>
+                <a:t>C</a:t>
+              </a:r>
+            </a:p>
+          </p:txBody>
+        </p:sp>
       </p:grpSp>
     </p:spTree>
     <p:extLst>

</xml_diff>